<commit_message>
Ajout du rapport presque terminé et du PPT mis à jour
</commit_message>
<xml_diff>
--- a/Projet 2 - donnees nutritionnelles/Presentation-Projet_2.pptx
+++ b/Projet 2 - donnees nutritionnelles/Presentation-Projet_2.pptx
@@ -10475,7 +10475,9 @@
           </a:xfrm>
         </p:spPr>
         <p:txBody>
-          <a:bodyPr/>
+          <a:bodyPr>
+            <a:normAutofit fontScale="62500" lnSpcReduction="20000"/>
+          </a:bodyPr>
           <a:lstStyle/>
           <a:p>
             <a:r>
@@ -10543,6 +10545,174 @@
               </a:rPr>
               <a:t>Ajouter les apports journaliers</a:t>
             </a:r>
+          </a:p>
+          <a:p>
+            <a:pPr lvl="1"/>
+            <a:endParaRPr lang="fr-FR" dirty="0" smtClean="0">
+              <a:solidFill>
+                <a:srgbClr val="E8750C"/>
+              </a:solidFill>
+            </a:endParaRPr>
+          </a:p>
+          <a:p>
+            <a:r>
+              <a:rPr lang="fr-FR" dirty="0" smtClean="0">
+                <a:solidFill>
+                  <a:srgbClr val="E8750C"/>
+                </a:solidFill>
+              </a:rPr>
+              <a:t>Synthèse</a:t>
+            </a:r>
+          </a:p>
+          <a:p>
+            <a:pPr lvl="1"/>
+            <a:r>
+              <a:rPr lang="fr-FR" dirty="0" smtClean="0">
+                <a:solidFill>
+                  <a:srgbClr val="E8750C"/>
+                </a:solidFill>
+              </a:rPr>
+              <a:t>Energie lié à la graisse (privilégier </a:t>
+            </a:r>
+            <a:r>
+              <a:rPr lang="fr-FR" dirty="0" err="1" smtClean="0">
+                <a:solidFill>
+                  <a:srgbClr val="E8750C"/>
+                </a:solidFill>
+              </a:rPr>
+              <a:t>unstaurated</a:t>
+            </a:r>
+            <a:r>
+              <a:rPr lang="fr-FR" dirty="0" smtClean="0">
+                <a:solidFill>
+                  <a:srgbClr val="E8750C"/>
+                </a:solidFill>
+              </a:rPr>
+              <a:t> fats)</a:t>
+            </a:r>
+          </a:p>
+          <a:p>
+            <a:pPr lvl="1"/>
+            <a:r>
+              <a:rPr lang="fr-FR" dirty="0" smtClean="0">
+                <a:solidFill>
+                  <a:srgbClr val="E8750C"/>
+                </a:solidFill>
+              </a:rPr>
+              <a:t>Produit naturels (peu d’additifs, allergènes, avec labels)</a:t>
+            </a:r>
+          </a:p>
+          <a:p>
+            <a:pPr lvl="1"/>
+            <a:r>
+              <a:rPr lang="fr-FR" dirty="0" smtClean="0">
+                <a:solidFill>
+                  <a:srgbClr val="E8750C"/>
+                </a:solidFill>
+              </a:rPr>
+              <a:t>Privilégier fruits</a:t>
+            </a:r>
+            <a:r>
+              <a:rPr lang="fr-FR" dirty="0">
+                <a:solidFill>
+                  <a:srgbClr val="E8750C"/>
+                </a:solidFill>
+              </a:rPr>
+              <a:t>, légumes, œufs, </a:t>
+            </a:r>
+            <a:r>
+              <a:rPr lang="fr-FR" dirty="0" smtClean="0">
+                <a:solidFill>
+                  <a:srgbClr val="E8750C"/>
+                </a:solidFill>
+              </a:rPr>
+              <a:t>céréales</a:t>
+            </a:r>
+          </a:p>
+          <a:p>
+            <a:pPr lvl="1"/>
+            <a:r>
+              <a:rPr lang="fr-FR" dirty="0" smtClean="0">
+                <a:solidFill>
+                  <a:srgbClr val="E8750C"/>
+                </a:solidFill>
+              </a:rPr>
+              <a:t>Éviter sucres ajoutés, </a:t>
+            </a:r>
+            <a:r>
+              <a:rPr lang="fr-FR" dirty="0" err="1" smtClean="0">
+                <a:solidFill>
+                  <a:srgbClr val="E8750C"/>
+                </a:solidFill>
+              </a:rPr>
+              <a:t>gateaux</a:t>
+            </a:r>
+            <a:r>
+              <a:rPr lang="fr-FR" dirty="0">
+                <a:solidFill>
+                  <a:srgbClr val="E8750C"/>
+                </a:solidFill>
+              </a:rPr>
+              <a:t>, </a:t>
+            </a:r>
+            <a:r>
+              <a:rPr lang="fr-FR" dirty="0" smtClean="0">
+                <a:solidFill>
+                  <a:srgbClr val="E8750C"/>
+                </a:solidFill>
+              </a:rPr>
+              <a:t>sodas, fromages</a:t>
+            </a:r>
+          </a:p>
+          <a:p>
+            <a:pPr lvl="1"/>
+            <a:r>
+              <a:rPr lang="fr-FR" dirty="0" smtClean="0">
+                <a:solidFill>
+                  <a:srgbClr val="E8750C"/>
+                </a:solidFill>
+              </a:rPr>
+              <a:t>Peu d’infos sur les vitamines</a:t>
+            </a:r>
+          </a:p>
+          <a:p>
+            <a:pPr lvl="1"/>
+            <a:endParaRPr lang="fr-FR" dirty="0" smtClean="0">
+              <a:solidFill>
+                <a:srgbClr val="E8750C"/>
+              </a:solidFill>
+            </a:endParaRPr>
+          </a:p>
+          <a:p>
+            <a:pPr lvl="1"/>
+            <a:endParaRPr lang="fr-FR" dirty="0" smtClean="0">
+              <a:solidFill>
+                <a:srgbClr val="E8750C"/>
+              </a:solidFill>
+            </a:endParaRPr>
+          </a:p>
+          <a:p>
+            <a:pPr lvl="1"/>
+            <a:endParaRPr lang="fr-FR" dirty="0" smtClean="0">
+              <a:solidFill>
+                <a:srgbClr val="E8750C"/>
+              </a:solidFill>
+            </a:endParaRPr>
+          </a:p>
+          <a:p>
+            <a:pPr lvl="1"/>
+            <a:endParaRPr lang="fr-FR" dirty="0" smtClean="0">
+              <a:solidFill>
+                <a:srgbClr val="E8750C"/>
+              </a:solidFill>
+            </a:endParaRPr>
+          </a:p>
+          <a:p>
+            <a:endParaRPr lang="fr-FR" dirty="0" smtClean="0">
+              <a:solidFill>
+                <a:srgbClr val="E8750C"/>
+              </a:solidFill>
+            </a:endParaRPr>
           </a:p>
         </p:txBody>
       </p:sp>
@@ -11264,12 +11434,12 @@
               <a:t>Nettoyage des données </a:t>
             </a:r>
             <a:r>
-              <a:rPr lang="fr-FR" dirty="0" err="1" smtClean="0">
-                <a:solidFill>
-                  <a:srgbClr val="E8750C"/>
-                </a:solidFill>
-              </a:rPr>
-              <a:t>abérantes</a:t>
+              <a:rPr lang="fr-FR" dirty="0" smtClean="0">
+                <a:solidFill>
+                  <a:srgbClr val="E8750C"/>
+                </a:solidFill>
+              </a:rPr>
+              <a:t>aberrantes</a:t>
             </a:r>
             <a:endParaRPr lang="fr-FR" dirty="0" smtClean="0">
               <a:solidFill>
@@ -15203,15 +15373,7 @@
                   <a:srgbClr val="E8750C"/>
                 </a:solidFill>
               </a:rPr>
-              <a:t> </a:t>
-            </a:r>
-            <a:r>
-              <a:rPr lang="fr-FR" sz="1400" dirty="0" smtClean="0">
-                <a:solidFill>
-                  <a:srgbClr val="E8750C"/>
-                </a:solidFill>
-              </a:rPr>
-              <a:t>+ 5 x Standard </a:t>
+              <a:t> + 5 x Standard </a:t>
             </a:r>
             <a:r>
               <a:rPr lang="fr-FR" sz="1400" dirty="0" err="1" smtClean="0">

</xml_diff>